<commit_message>
Deployed cc48988 with MkDocs version: 0.17.5
</commit_message>
<xml_diff>
--- a/materials/day4/files/osgus19-day4-part1-overall-data.pptx
+++ b/materials/day4/files/osgus19-day4-part1-overall-data.pptx
@@ -16856,7 +16856,7 @@
           <p:nvPr>
             <p:extLst>
               <p:ext uri="{D42A27DB-BD31-4B8C-83A1-F6EECF244321}">
-                <p14:modId xmlns:p14="http://schemas.microsoft.com/office/powerpoint/2010/main" val="2083380740"/>
+                <p14:modId xmlns:p14="http://schemas.microsoft.com/office/powerpoint/2010/main" val="3687176870"/>
               </p:ext>
             </p:extLst>
           </p:nvPr>
@@ -17624,7 +17624,7 @@
                         <a:buNone/>
                       </a:pPr>
                       <a:r>
-                        <a:rPr lang="en-US" sz="1800" b="0" i="0" u="none" strike="noStrike" cap="none">
+                        <a:rPr lang="en-US" sz="1800" b="0" i="0" u="none" strike="noStrike" cap="none" dirty="0">
                           <a:solidFill>
                             <a:srgbClr val="000000"/>
                           </a:solidFill>
@@ -17635,7 +17635,7 @@
                         </a:rPr>
                         <a:t>1GB - 20GB, unique or shared</a:t>
                       </a:r>
-                      <a:endParaRPr/>
+                      <a:endParaRPr dirty="0"/>
                     </a:p>
                   </a:txBody>
                   <a:tcPr marL="91450" marR="91450" marT="45725" marB="45725">
@@ -19476,7 +19476,7 @@
           <p:nvPr>
             <p:extLst>
               <p:ext uri="{D42A27DB-BD31-4B8C-83A1-F6EECF244321}">
-                <p14:modId xmlns:p14="http://schemas.microsoft.com/office/powerpoint/2010/main" val="3259836376"/>
+                <p14:modId xmlns:p14="http://schemas.microsoft.com/office/powerpoint/2010/main" val="539614008"/>
               </p:ext>
             </p:extLst>
           </p:nvPr>
@@ -20244,7 +20244,7 @@
                         <a:buNone/>
                       </a:pPr>
                       <a:r>
-                        <a:rPr lang="en-US" sz="1800" b="0" i="0" u="none" strike="noStrike" cap="none">
+                        <a:rPr lang="en-US" sz="1800" b="0" i="0" u="none" strike="noStrike" cap="none" dirty="0">
                           <a:solidFill>
                             <a:srgbClr val="000000"/>
                           </a:solidFill>
@@ -20255,7 +20255,7 @@
                         </a:rPr>
                         <a:t>1GB - 20GB, unique or shared</a:t>
                       </a:r>
-                      <a:endParaRPr/>
+                      <a:endParaRPr dirty="0"/>
                     </a:p>
                   </a:txBody>
                   <a:tcPr marL="91450" marR="91450" marT="45725" marB="45725">
@@ -25643,7 +25643,7 @@
           <p:nvPr>
             <p:extLst>
               <p:ext uri="{D42A27DB-BD31-4B8C-83A1-F6EECF244321}">
-                <p14:modId xmlns:p14="http://schemas.microsoft.com/office/powerpoint/2010/main" val="2976700199"/>
+                <p14:modId xmlns:p14="http://schemas.microsoft.com/office/powerpoint/2010/main" val="3025354449"/>
               </p:ext>
             </p:extLst>
           </p:nvPr>
@@ -26411,7 +26411,7 @@
                         <a:buNone/>
                       </a:pPr>
                       <a:r>
-                        <a:rPr lang="en-US" sz="1800" b="1" i="0" u="none" strike="noStrike" cap="none">
+                        <a:rPr lang="en-US" sz="1800" b="1" i="0" u="none" strike="noStrike" cap="none" dirty="0">
                           <a:solidFill>
                             <a:srgbClr val="000000"/>
                           </a:solidFill>
@@ -26422,7 +26422,7 @@
                         </a:rPr>
                         <a:t>1GB - 20GB, unique or shared</a:t>
                       </a:r>
-                      <a:endParaRPr b="1"/>
+                      <a:endParaRPr b="1" dirty="0"/>
                     </a:p>
                   </a:txBody>
                   <a:tcPr marL="91450" marR="91450" marT="45725" marB="45725">

</xml_diff>